<commit_message>
Subindo mockups de tela e atualização do ppt de atividades
</commit_message>
<xml_diff>
--- a/Documentação/Orientações/Orientações.pptx
+++ b/Documentação/Orientações/Orientações.pptx
@@ -279,7 +279,7 @@
           <a:p>
             <a:fld id="{02AC24A9-CCB6-4F8D-B8DB-C2F3692CFA5A}" type="datetimeFigureOut">
               <a:rPr lang="en-US" smtClean="0"/>
-              <a:t>10/9/2020</a:t>
+              <a:t>10/10/2020</a:t>
             </a:fld>
             <a:endParaRPr lang="en-US" dirty="0"/>
           </a:p>
@@ -338,7 +338,7 @@
           <a:p>
             <a:fld id="{B2DC25EE-239B-4C5F-AAD1-255A7D5F1EE2}" type="slidenum">
               <a:rPr lang="en-US" smtClean="0"/>
-              <a:t>‹nº›</a:t>
+              <a:t>‹#›</a:t>
             </a:fld>
             <a:endParaRPr lang="en-US" dirty="0"/>
           </a:p>
@@ -649,7 +649,7 @@
           <a:p>
             <a:fld id="{02AC24A9-CCB6-4F8D-B8DB-C2F3692CFA5A}" type="datetimeFigureOut">
               <a:rPr lang="en-US" smtClean="0"/>
-              <a:t>10/9/2020</a:t>
+              <a:t>10/10/2020</a:t>
             </a:fld>
             <a:endParaRPr lang="en-US"/>
           </a:p>
@@ -703,7 +703,7 @@
           <a:p>
             <a:fld id="{B2DC25EE-239B-4C5F-AAD1-255A7D5F1EE2}" type="slidenum">
               <a:rPr lang="en-US" smtClean="0"/>
-              <a:t>‹nº›</a:t>
+              <a:t>‹#›</a:t>
             </a:fld>
             <a:endParaRPr lang="en-US"/>
           </a:p>
@@ -858,7 +858,7 @@
           <a:p>
             <a:fld id="{02AC24A9-CCB6-4F8D-B8DB-C2F3692CFA5A}" type="datetimeFigureOut">
               <a:rPr lang="en-US" smtClean="0"/>
-              <a:t>10/9/2020</a:t>
+              <a:t>10/10/2020</a:t>
             </a:fld>
             <a:endParaRPr lang="en-US"/>
           </a:p>
@@ -912,7 +912,7 @@
           <a:p>
             <a:fld id="{B2DC25EE-239B-4C5F-AAD1-255A7D5F1EE2}" type="slidenum">
               <a:rPr lang="en-US" smtClean="0"/>
-              <a:t>‹nº›</a:t>
+              <a:t>‹#›</a:t>
             </a:fld>
             <a:endParaRPr lang="en-US"/>
           </a:p>
@@ -1328,7 +1328,7 @@
           <a:p>
             <a:fld id="{02AC24A9-CCB6-4F8D-B8DB-C2F3692CFA5A}" type="datetimeFigureOut">
               <a:rPr lang="en-US" smtClean="0"/>
-              <a:t>10/9/2020</a:t>
+              <a:t>10/10/2020</a:t>
             </a:fld>
             <a:endParaRPr lang="en-US"/>
           </a:p>
@@ -1387,7 +1387,7 @@
           <a:p>
             <a:fld id="{B2DC25EE-239B-4C5F-AAD1-255A7D5F1EE2}" type="slidenum">
               <a:rPr lang="en-US" smtClean="0"/>
-              <a:t>‹nº›</a:t>
+              <a:t>‹#›</a:t>
             </a:fld>
             <a:endParaRPr lang="en-US"/>
           </a:p>
@@ -1782,7 +1782,7 @@
           <a:p>
             <a:fld id="{02AC24A9-CCB6-4F8D-B8DB-C2F3692CFA5A}" type="datetimeFigureOut">
               <a:rPr lang="en-US" smtClean="0"/>
-              <a:t>10/9/2020</a:t>
+              <a:t>10/10/2020</a:t>
             </a:fld>
             <a:endParaRPr lang="en-US"/>
           </a:p>
@@ -1836,7 +1836,7 @@
           <a:p>
             <a:fld id="{B2DC25EE-239B-4C5F-AAD1-255A7D5F1EE2}" type="slidenum">
               <a:rPr lang="en-US" smtClean="0"/>
-              <a:t>‹nº›</a:t>
+              <a:t>‹#›</a:t>
             </a:fld>
             <a:endParaRPr lang="en-US"/>
           </a:p>
@@ -2314,7 +2314,7 @@
           <a:p>
             <a:fld id="{02AC24A9-CCB6-4F8D-B8DB-C2F3692CFA5A}" type="datetimeFigureOut">
               <a:rPr lang="en-US" smtClean="0"/>
-              <a:t>10/9/2020</a:t>
+              <a:t>10/10/2020</a:t>
             </a:fld>
             <a:endParaRPr lang="en-US"/>
           </a:p>
@@ -2373,7 +2373,7 @@
           <a:p>
             <a:fld id="{B2DC25EE-239B-4C5F-AAD1-255A7D5F1EE2}" type="slidenum">
               <a:rPr lang="en-US" smtClean="0"/>
-              <a:t>‹nº›</a:t>
+              <a:t>‹#›</a:t>
             </a:fld>
             <a:endParaRPr lang="en-US"/>
           </a:p>
@@ -3013,7 +3013,7 @@
           <a:p>
             <a:fld id="{02AC24A9-CCB6-4F8D-B8DB-C2F3692CFA5A}" type="datetimeFigureOut">
               <a:rPr lang="en-US" smtClean="0"/>
-              <a:t>10/9/2020</a:t>
+              <a:t>10/10/2020</a:t>
             </a:fld>
             <a:endParaRPr lang="en-US"/>
           </a:p>
@@ -3072,7 +3072,7 @@
           <a:p>
             <a:fld id="{B2DC25EE-239B-4C5F-AAD1-255A7D5F1EE2}" type="slidenum">
               <a:rPr lang="en-US" smtClean="0"/>
-              <a:t>‹nº›</a:t>
+              <a:t>‹#›</a:t>
             </a:fld>
             <a:endParaRPr lang="en-US"/>
           </a:p>
@@ -3342,7 +3342,7 @@
           <a:p>
             <a:fld id="{02AC24A9-CCB6-4F8D-B8DB-C2F3692CFA5A}" type="datetimeFigureOut">
               <a:rPr lang="en-US" smtClean="0"/>
-              <a:t>10/9/2020</a:t>
+              <a:t>10/10/2020</a:t>
             </a:fld>
             <a:endParaRPr lang="en-US"/>
           </a:p>
@@ -3396,7 +3396,7 @@
           <a:p>
             <a:fld id="{B2DC25EE-239B-4C5F-AAD1-255A7D5F1EE2}" type="slidenum">
               <a:rPr lang="en-US" smtClean="0"/>
-              <a:t>‹nº›</a:t>
+              <a:t>‹#›</a:t>
             </a:fld>
             <a:endParaRPr lang="en-US"/>
           </a:p>
@@ -3455,7 +3455,7 @@
           <a:p>
             <a:fld id="{02AC24A9-CCB6-4F8D-B8DB-C2F3692CFA5A}" type="datetimeFigureOut">
               <a:rPr lang="en-US" smtClean="0"/>
-              <a:t>10/9/2020</a:t>
+              <a:t>10/10/2020</a:t>
             </a:fld>
             <a:endParaRPr lang="en-US"/>
           </a:p>
@@ -3509,7 +3509,7 @@
           <a:p>
             <a:fld id="{B2DC25EE-239B-4C5F-AAD1-255A7D5F1EE2}" type="slidenum">
               <a:rPr lang="en-US" smtClean="0"/>
-              <a:t>‹nº›</a:t>
+              <a:t>‹#›</a:t>
             </a:fld>
             <a:endParaRPr lang="en-US"/>
           </a:p>
@@ -3950,7 +3950,7 @@
           <a:p>
             <a:fld id="{02AC24A9-CCB6-4F8D-B8DB-C2F3692CFA5A}" type="datetimeFigureOut">
               <a:rPr lang="en-US" smtClean="0"/>
-              <a:t>10/9/2020</a:t>
+              <a:t>10/10/2020</a:t>
             </a:fld>
             <a:endParaRPr lang="en-US" dirty="0"/>
           </a:p>
@@ -4004,7 +4004,7 @@
           <a:p>
             <a:fld id="{B2DC25EE-239B-4C5F-AAD1-255A7D5F1EE2}" type="slidenum">
               <a:rPr lang="en-US" smtClean="0"/>
-              <a:t>‹nº›</a:t>
+              <a:t>‹#›</a:t>
             </a:fld>
             <a:endParaRPr lang="en-US"/>
           </a:p>
@@ -4427,7 +4427,7 @@
           <a:p>
             <a:fld id="{02AC24A9-CCB6-4F8D-B8DB-C2F3692CFA5A}" type="datetimeFigureOut">
               <a:rPr lang="en-US" smtClean="0"/>
-              <a:t>10/9/2020</a:t>
+              <a:t>10/10/2020</a:t>
             </a:fld>
             <a:endParaRPr lang="en-US"/>
           </a:p>
@@ -4481,7 +4481,7 @@
           <a:p>
             <a:fld id="{B2DC25EE-239B-4C5F-AAD1-255A7D5F1EE2}" type="slidenum">
               <a:rPr lang="en-US" smtClean="0"/>
-              <a:t>‹nº›</a:t>
+              <a:t>‹#›</a:t>
             </a:fld>
             <a:endParaRPr lang="en-US"/>
           </a:p>
@@ -4670,7 +4670,7 @@
           <a:p>
             <a:fld id="{02AC24A9-CCB6-4F8D-B8DB-C2F3692CFA5A}" type="datetimeFigureOut">
               <a:rPr lang="en-US" smtClean="0"/>
-              <a:t>10/9/2020</a:t>
+              <a:t>10/10/2020</a:t>
             </a:fld>
             <a:endParaRPr lang="en-US"/>
           </a:p>
@@ -4760,7 +4760,7 @@
           <a:p>
             <a:fld id="{B2DC25EE-239B-4C5F-AAD1-255A7D5F1EE2}" type="slidenum">
               <a:rPr lang="en-US" smtClean="0"/>
-              <a:t>‹nº›</a:t>
+              <a:t>‹#›</a:t>
             </a:fld>
             <a:endParaRPr lang="en-US"/>
           </a:p>
@@ -5883,36 +5883,6 @@
           </a:prstGeom>
         </p:spPr>
       </p:pic>
-      <p:pic>
-        <p:nvPicPr>
-          <p:cNvPr id="27" name="Picture 11" descr="Icon&#10;&#10;Description automatically generated">
-            <a:extLst>
-              <a:ext uri="{FF2B5EF4-FFF2-40B4-BE49-F238E27FC236}">
-                <a16:creationId xmlns:a16="http://schemas.microsoft.com/office/drawing/2014/main" id="{866B7DA9-E3CC-4E20-80DF-52438986BDE4}"/>
-              </a:ext>
-            </a:extLst>
-          </p:cNvPr>
-          <p:cNvPicPr>
-            <a:picLocks noChangeAspect="1"/>
-          </p:cNvPicPr>
-          <p:nvPr/>
-        </p:nvPicPr>
-        <p:blipFill>
-          <a:blip r:embed="rId4"/>
-          <a:stretch>
-            <a:fillRect/>
-          </a:stretch>
-        </p:blipFill>
-        <p:spPr>
-          <a:xfrm>
-            <a:off x="2361234" y="3783957"/>
-            <a:ext cx="283580" cy="273935"/>
-          </a:xfrm>
-          <a:prstGeom prst="rect">
-            <a:avLst/>
-          </a:prstGeom>
-        </p:spPr>
-      </p:pic>
       <p:sp>
         <p:nvSpPr>
           <p:cNvPr id="12" name="Rectangle 11">
@@ -5980,7 +5950,7 @@
           <p:nvPr/>
         </p:nvPicPr>
         <p:blipFill>
-          <a:blip r:embed="rId5"/>
+          <a:blip r:embed="rId4"/>
           <a:stretch>
             <a:fillRect/>
           </a:stretch>
@@ -6010,7 +5980,7 @@
           <p:nvPr/>
         </p:nvPicPr>
         <p:blipFill>
-          <a:blip r:embed="rId5"/>
+          <a:blip r:embed="rId4"/>
           <a:stretch>
             <a:fillRect/>
           </a:stretch>
@@ -6100,7 +6070,7 @@
           <p:nvPr/>
         </p:nvPicPr>
         <p:blipFill>
-          <a:blip r:embed="rId5"/>
+          <a:blip r:embed="rId4"/>
           <a:stretch>
             <a:fillRect/>
           </a:stretch>
@@ -6160,7 +6130,7 @@
           <p:nvPr/>
         </p:nvPicPr>
         <p:blipFill>
-          <a:blip r:embed="rId5"/>
+          <a:blip r:embed="rId4"/>
           <a:stretch>
             <a:fillRect/>
           </a:stretch>
@@ -6190,7 +6160,7 @@
           <p:nvPr/>
         </p:nvPicPr>
         <p:blipFill>
-          <a:blip r:embed="rId4"/>
+          <a:blip r:embed="rId5"/>
           <a:stretch>
             <a:fillRect/>
           </a:stretch>
@@ -6478,7 +6448,7 @@
           <p:nvPr/>
         </p:nvPicPr>
         <p:blipFill>
-          <a:blip r:embed="rId4"/>
+          <a:blip r:embed="rId5"/>
           <a:stretch>
             <a:fillRect/>
           </a:stretch>
@@ -6495,10 +6465,10 @@
       </p:pic>
       <p:pic>
         <p:nvPicPr>
-          <p:cNvPr id="57" name="Picture 11" descr="Icon&#10;&#10;Description automatically generated">
-            <a:extLst>
-              <a:ext uri="{FF2B5EF4-FFF2-40B4-BE49-F238E27FC236}">
-                <a16:creationId xmlns:a16="http://schemas.microsoft.com/office/drawing/2014/main" id="{23997025-AFCA-4ED0-8DBE-F1E67C6B2DE5}"/>
+          <p:cNvPr id="58" name="Picture 15" descr="Icon&#10;&#10;Description automatically generated">
+            <a:extLst>
+              <a:ext uri="{FF2B5EF4-FFF2-40B4-BE49-F238E27FC236}">
+                <a16:creationId xmlns:a16="http://schemas.microsoft.com/office/drawing/2014/main" id="{C9C79A4F-9100-49CE-B7B5-A01823F33F54}"/>
               </a:ext>
             </a:extLst>
           </p:cNvPr>
@@ -6515,36 +6485,6 @@
         </p:blipFill>
         <p:spPr>
           <a:xfrm>
-            <a:off x="9194234" y="3192463"/>
-            <a:ext cx="283580" cy="273935"/>
-          </a:xfrm>
-          <a:prstGeom prst="rect">
-            <a:avLst/>
-          </a:prstGeom>
-        </p:spPr>
-      </p:pic>
-      <p:pic>
-        <p:nvPicPr>
-          <p:cNvPr id="58" name="Picture 15" descr="Icon&#10;&#10;Description automatically generated">
-            <a:extLst>
-              <a:ext uri="{FF2B5EF4-FFF2-40B4-BE49-F238E27FC236}">
-                <a16:creationId xmlns:a16="http://schemas.microsoft.com/office/drawing/2014/main" id="{C9C79A4F-9100-49CE-B7B5-A01823F33F54}"/>
-              </a:ext>
-            </a:extLst>
-          </p:cNvPr>
-          <p:cNvPicPr>
-            <a:picLocks noChangeAspect="1"/>
-          </p:cNvPicPr>
-          <p:nvPr/>
-        </p:nvPicPr>
-        <p:blipFill>
-          <a:blip r:embed="rId5"/>
-          <a:stretch>
-            <a:fillRect/>
-          </a:stretch>
-        </p:blipFill>
-        <p:spPr>
-          <a:xfrm>
             <a:off x="10715335" y="3552773"/>
             <a:ext cx="322162" cy="293226"/>
           </a:xfrm>
@@ -6636,6 +6576,66 @@
         <p:spPr>
           <a:xfrm>
             <a:off x="9860451" y="5527240"/>
+            <a:ext cx="360745" cy="351100"/>
+          </a:xfrm>
+          <a:prstGeom prst="rect">
+            <a:avLst/>
+          </a:prstGeom>
+        </p:spPr>
+      </p:pic>
+      <p:pic>
+        <p:nvPicPr>
+          <p:cNvPr id="2" name="Picture 9" descr="Icon&#10;&#10;Description automatically generated">
+            <a:extLst>
+              <a:ext uri="{FF2B5EF4-FFF2-40B4-BE49-F238E27FC236}">
+                <a16:creationId xmlns:a16="http://schemas.microsoft.com/office/drawing/2014/main" id="{0641A489-4088-4547-A7CB-F55B386DC83B}"/>
+              </a:ext>
+            </a:extLst>
+          </p:cNvPr>
+          <p:cNvPicPr>
+            <a:picLocks noChangeAspect="1"/>
+          </p:cNvPicPr>
+          <p:nvPr/>
+        </p:nvPicPr>
+        <p:blipFill>
+          <a:blip r:embed="rId3"/>
+          <a:stretch>
+            <a:fillRect/>
+          </a:stretch>
+        </p:blipFill>
+        <p:spPr>
+          <a:xfrm>
+            <a:off x="2349612" y="3729273"/>
+            <a:ext cx="360745" cy="351100"/>
+          </a:xfrm>
+          <a:prstGeom prst="rect">
+            <a:avLst/>
+          </a:prstGeom>
+        </p:spPr>
+      </p:pic>
+      <p:pic>
+        <p:nvPicPr>
+          <p:cNvPr id="3" name="Picture 9" descr="Icon&#10;&#10;Description automatically generated">
+            <a:extLst>
+              <a:ext uri="{FF2B5EF4-FFF2-40B4-BE49-F238E27FC236}">
+                <a16:creationId xmlns:a16="http://schemas.microsoft.com/office/drawing/2014/main" id="{ADA9468D-30FE-4B0D-8B94-78BEC3D7975F}"/>
+              </a:ext>
+            </a:extLst>
+          </p:cNvPr>
+          <p:cNvPicPr>
+            <a:picLocks noChangeAspect="1"/>
+          </p:cNvPicPr>
+          <p:nvPr/>
+        </p:nvPicPr>
+        <p:blipFill>
+          <a:blip r:embed="rId3"/>
+          <a:stretch>
+            <a:fillRect/>
+          </a:stretch>
+        </p:blipFill>
+        <p:spPr>
+          <a:xfrm>
+            <a:off x="9185472" y="3164614"/>
             <a:ext cx="360745" cy="351100"/>
           </a:xfrm>
           <a:prstGeom prst="rect">
@@ -6999,10 +6999,10 @@
       </p:pic>
       <p:pic>
         <p:nvPicPr>
-          <p:cNvPr id="6" name="Picture 11" descr="Icon&#10;&#10;Description automatically generated">
-            <a:extLst>
-              <a:ext uri="{FF2B5EF4-FFF2-40B4-BE49-F238E27FC236}">
-                <a16:creationId xmlns:a16="http://schemas.microsoft.com/office/drawing/2014/main" id="{C5134A0C-2F9D-461C-AA98-D0EC18B9D36C}"/>
+          <p:cNvPr id="7" name="Picture 15" descr="Icon&#10;&#10;Description automatically generated">
+            <a:extLst>
+              <a:ext uri="{FF2B5EF4-FFF2-40B4-BE49-F238E27FC236}">
+                <a16:creationId xmlns:a16="http://schemas.microsoft.com/office/drawing/2014/main" id="{4414CAE9-7D55-4DA0-9A44-BA397F67C2BD}"/>
               </a:ext>
             </a:extLst>
           </p:cNvPr>
@@ -7019,36 +7019,6 @@
         </p:blipFill>
         <p:spPr>
           <a:xfrm>
-            <a:off x="3200400" y="6031375"/>
-            <a:ext cx="283580" cy="273935"/>
-          </a:xfrm>
-          <a:prstGeom prst="rect">
-            <a:avLst/>
-          </a:prstGeom>
-        </p:spPr>
-      </p:pic>
-      <p:pic>
-        <p:nvPicPr>
-          <p:cNvPr id="7" name="Picture 15" descr="Icon&#10;&#10;Description automatically generated">
-            <a:extLst>
-              <a:ext uri="{FF2B5EF4-FFF2-40B4-BE49-F238E27FC236}">
-                <a16:creationId xmlns:a16="http://schemas.microsoft.com/office/drawing/2014/main" id="{4414CAE9-7D55-4DA0-9A44-BA397F67C2BD}"/>
-              </a:ext>
-            </a:extLst>
-          </p:cNvPr>
-          <p:cNvPicPr>
-            <a:picLocks noChangeAspect="1"/>
-          </p:cNvPicPr>
-          <p:nvPr/>
-        </p:nvPicPr>
-        <p:blipFill>
-          <a:blip r:embed="rId5"/>
-          <a:stretch>
-            <a:fillRect/>
-          </a:stretch>
-        </p:blipFill>
-        <p:spPr>
-          <a:xfrm>
             <a:off x="6190524" y="4922133"/>
             <a:ext cx="312517" cy="302871"/>
           </a:xfrm>
@@ -7179,10 +7149,10 @@
       </p:pic>
       <p:pic>
         <p:nvPicPr>
-          <p:cNvPr id="25" name="Picture 15" descr="Icon&#10;&#10;Description automatically generated">
-            <a:extLst>
-              <a:ext uri="{FF2B5EF4-FFF2-40B4-BE49-F238E27FC236}">
-                <a16:creationId xmlns:a16="http://schemas.microsoft.com/office/drawing/2014/main" id="{4437882C-E62D-447C-A114-B1731AD2BAB1}"/>
+          <p:cNvPr id="8" name="Picture 9" descr="Icon&#10;&#10;Description automatically generated">
+            <a:extLst>
+              <a:ext uri="{FF2B5EF4-FFF2-40B4-BE49-F238E27FC236}">
+                <a16:creationId xmlns:a16="http://schemas.microsoft.com/office/drawing/2014/main" id="{B4B370D7-8D8B-43D6-846D-09FF44CA9EF9}"/>
               </a:ext>
             </a:extLst>
           </p:cNvPr>
@@ -7192,15 +7162,15 @@
           <p:nvPr/>
         </p:nvPicPr>
         <p:blipFill>
-          <a:blip r:embed="rId5"/>
+          <a:blip r:embed="rId3"/>
           <a:stretch>
             <a:fillRect/>
           </a:stretch>
         </p:blipFill>
         <p:spPr>
           <a:xfrm>
-            <a:off x="6894650" y="3427069"/>
-            <a:ext cx="312517" cy="302871"/>
+            <a:off x="10106626" y="543045"/>
+            <a:ext cx="360745" cy="351100"/>
           </a:xfrm>
           <a:prstGeom prst="rect">
             <a:avLst/>
@@ -7209,10 +7179,10 @@
       </p:pic>
       <p:pic>
         <p:nvPicPr>
-          <p:cNvPr id="26" name="Picture 11" descr="Icon&#10;&#10;Description automatically generated">
-            <a:extLst>
-              <a:ext uri="{FF2B5EF4-FFF2-40B4-BE49-F238E27FC236}">
-                <a16:creationId xmlns:a16="http://schemas.microsoft.com/office/drawing/2014/main" id="{7B44414F-0D31-4540-AF2A-0057132619AC}"/>
+          <p:cNvPr id="9" name="Picture 15" descr="Icon&#10;&#10;Description automatically generated">
+            <a:extLst>
+              <a:ext uri="{FF2B5EF4-FFF2-40B4-BE49-F238E27FC236}">
+                <a16:creationId xmlns:a16="http://schemas.microsoft.com/office/drawing/2014/main" id="{6D351F39-0186-491B-89C4-35C6D9498A2A}"/>
               </a:ext>
             </a:extLst>
           </p:cNvPr>
@@ -7229,8 +7199,8 @@
         </p:blipFill>
         <p:spPr>
           <a:xfrm>
-            <a:off x="4232474" y="3812893"/>
-            <a:ext cx="283580" cy="273935"/>
+            <a:off x="10125917" y="1411145"/>
+            <a:ext cx="322162" cy="293226"/>
           </a:xfrm>
           <a:prstGeom prst="rect">
             <a:avLst/>
@@ -7239,70 +7209,10 @@
       </p:pic>
       <p:pic>
         <p:nvPicPr>
-          <p:cNvPr id="27" name="Picture 11" descr="Icon&#10;&#10;Description automatically generated">
-            <a:extLst>
-              <a:ext uri="{FF2B5EF4-FFF2-40B4-BE49-F238E27FC236}">
-                <a16:creationId xmlns:a16="http://schemas.microsoft.com/office/drawing/2014/main" id="{8E0B1506-FD28-427C-BE61-6DC22ABEC9B0}"/>
-              </a:ext>
-            </a:extLst>
-          </p:cNvPr>
-          <p:cNvPicPr>
-            <a:picLocks noChangeAspect="1"/>
-          </p:cNvPicPr>
-          <p:nvPr/>
-        </p:nvPicPr>
-        <p:blipFill>
-          <a:blip r:embed="rId4"/>
-          <a:stretch>
-            <a:fillRect/>
-          </a:stretch>
-        </p:blipFill>
-        <p:spPr>
-          <a:xfrm>
-            <a:off x="8862347" y="3050892"/>
-            <a:ext cx="283580" cy="273935"/>
-          </a:xfrm>
-          <a:prstGeom prst="rect">
-            <a:avLst/>
-          </a:prstGeom>
-        </p:spPr>
-      </p:pic>
-      <p:pic>
-        <p:nvPicPr>
-          <p:cNvPr id="8" name="Picture 9" descr="Icon&#10;&#10;Description automatically generated">
-            <a:extLst>
-              <a:ext uri="{FF2B5EF4-FFF2-40B4-BE49-F238E27FC236}">
-                <a16:creationId xmlns:a16="http://schemas.microsoft.com/office/drawing/2014/main" id="{B4B370D7-8D8B-43D6-846D-09FF44CA9EF9}"/>
-              </a:ext>
-            </a:extLst>
-          </p:cNvPr>
-          <p:cNvPicPr>
-            <a:picLocks noChangeAspect="1"/>
-          </p:cNvPicPr>
-          <p:nvPr/>
-        </p:nvPicPr>
-        <p:blipFill>
-          <a:blip r:embed="rId3"/>
-          <a:stretch>
-            <a:fillRect/>
-          </a:stretch>
-        </p:blipFill>
-        <p:spPr>
-          <a:xfrm>
-            <a:off x="10106626" y="543045"/>
-            <a:ext cx="360745" cy="351100"/>
-          </a:xfrm>
-          <a:prstGeom prst="rect">
-            <a:avLst/>
-          </a:prstGeom>
-        </p:spPr>
-      </p:pic>
-      <p:pic>
-        <p:nvPicPr>
-          <p:cNvPr id="9" name="Picture 15" descr="Icon&#10;&#10;Description automatically generated">
-            <a:extLst>
-              <a:ext uri="{FF2B5EF4-FFF2-40B4-BE49-F238E27FC236}">
-                <a16:creationId xmlns:a16="http://schemas.microsoft.com/office/drawing/2014/main" id="{6D351F39-0186-491B-89C4-35C6D9498A2A}"/>
+          <p:cNvPr id="10" name="Picture 11" descr="Icon&#10;&#10;Description automatically generated">
+            <a:extLst>
+              <a:ext uri="{FF2B5EF4-FFF2-40B4-BE49-F238E27FC236}">
+                <a16:creationId xmlns:a16="http://schemas.microsoft.com/office/drawing/2014/main" id="{EF99B988-4C33-4092-9CBA-B35B2DD50C56}"/>
               </a:ext>
             </a:extLst>
           </p:cNvPr>
@@ -7313,36 +7223,6 @@
         </p:nvPicPr>
         <p:blipFill>
           <a:blip r:embed="rId5"/>
-          <a:stretch>
-            <a:fillRect/>
-          </a:stretch>
-        </p:blipFill>
-        <p:spPr>
-          <a:xfrm>
-            <a:off x="10125917" y="1411145"/>
-            <a:ext cx="322162" cy="293226"/>
-          </a:xfrm>
-          <a:prstGeom prst="rect">
-            <a:avLst/>
-          </a:prstGeom>
-        </p:spPr>
-      </p:pic>
-      <p:pic>
-        <p:nvPicPr>
-          <p:cNvPr id="10" name="Picture 11" descr="Icon&#10;&#10;Description automatically generated">
-            <a:extLst>
-              <a:ext uri="{FF2B5EF4-FFF2-40B4-BE49-F238E27FC236}">
-                <a16:creationId xmlns:a16="http://schemas.microsoft.com/office/drawing/2014/main" id="{EF99B988-4C33-4092-9CBA-B35B2DD50C56}"/>
-              </a:ext>
-            </a:extLst>
-          </p:cNvPr>
-          <p:cNvPicPr>
-            <a:picLocks noChangeAspect="1"/>
-          </p:cNvPicPr>
-          <p:nvPr/>
-        </p:nvPicPr>
-        <p:blipFill>
-          <a:blip r:embed="rId4"/>
           <a:stretch>
             <a:fillRect/>
           </a:stretch>
@@ -7518,6 +7398,126 @@
         <p:spPr>
           <a:xfrm>
             <a:off x="3158288" y="5654467"/>
+            <a:ext cx="360745" cy="351100"/>
+          </a:xfrm>
+          <a:prstGeom prst="rect">
+            <a:avLst/>
+          </a:prstGeom>
+        </p:spPr>
+      </p:pic>
+      <p:pic>
+        <p:nvPicPr>
+          <p:cNvPr id="2" name="Picture 9" descr="Icon&#10;&#10;Description automatically generated">
+            <a:extLst>
+              <a:ext uri="{FF2B5EF4-FFF2-40B4-BE49-F238E27FC236}">
+                <a16:creationId xmlns:a16="http://schemas.microsoft.com/office/drawing/2014/main" id="{0856C06D-C6C0-4736-9D2E-6E4B3F21B1DD}"/>
+              </a:ext>
+            </a:extLst>
+          </p:cNvPr>
+          <p:cNvPicPr>
+            <a:picLocks noChangeAspect="1"/>
+          </p:cNvPicPr>
+          <p:nvPr/>
+        </p:nvPicPr>
+        <p:blipFill>
+          <a:blip r:embed="rId3"/>
+          <a:stretch>
+            <a:fillRect/>
+          </a:stretch>
+        </p:blipFill>
+        <p:spPr>
+          <a:xfrm>
+            <a:off x="8820872" y="2978289"/>
+            <a:ext cx="360745" cy="351100"/>
+          </a:xfrm>
+          <a:prstGeom prst="rect">
+            <a:avLst/>
+          </a:prstGeom>
+        </p:spPr>
+      </p:pic>
+      <p:pic>
+        <p:nvPicPr>
+          <p:cNvPr id="4" name="Picture 9" descr="Icon&#10;&#10;Description automatically generated">
+            <a:extLst>
+              <a:ext uri="{FF2B5EF4-FFF2-40B4-BE49-F238E27FC236}">
+                <a16:creationId xmlns:a16="http://schemas.microsoft.com/office/drawing/2014/main" id="{A0DAC361-A4FF-47EF-ADB9-203C127C86AC}"/>
+              </a:ext>
+            </a:extLst>
+          </p:cNvPr>
+          <p:cNvPicPr>
+            <a:picLocks noChangeAspect="1"/>
+          </p:cNvPicPr>
+          <p:nvPr/>
+        </p:nvPicPr>
+        <p:blipFill>
+          <a:blip r:embed="rId3"/>
+          <a:stretch>
+            <a:fillRect/>
+          </a:stretch>
+        </p:blipFill>
+        <p:spPr>
+          <a:xfrm>
+            <a:off x="6930289" y="3410748"/>
+            <a:ext cx="360745" cy="351100"/>
+          </a:xfrm>
+          <a:prstGeom prst="rect">
+            <a:avLst/>
+          </a:prstGeom>
+        </p:spPr>
+      </p:pic>
+      <p:pic>
+        <p:nvPicPr>
+          <p:cNvPr id="13" name="Picture 9" descr="Icon&#10;&#10;Description automatically generated">
+            <a:extLst>
+              <a:ext uri="{FF2B5EF4-FFF2-40B4-BE49-F238E27FC236}">
+                <a16:creationId xmlns:a16="http://schemas.microsoft.com/office/drawing/2014/main" id="{DBFD0A3D-ECB3-437A-A3C0-FD7A7FF022A0}"/>
+              </a:ext>
+            </a:extLst>
+          </p:cNvPr>
+          <p:cNvPicPr>
+            <a:picLocks noChangeAspect="1"/>
+          </p:cNvPicPr>
+          <p:nvPr/>
+        </p:nvPicPr>
+        <p:blipFill>
+          <a:blip r:embed="rId3"/>
+          <a:stretch>
+            <a:fillRect/>
+          </a:stretch>
+        </p:blipFill>
+        <p:spPr>
+          <a:xfrm>
+            <a:off x="4263138" y="3761848"/>
+            <a:ext cx="360745" cy="351100"/>
+          </a:xfrm>
+          <a:prstGeom prst="rect">
+            <a:avLst/>
+          </a:prstGeom>
+        </p:spPr>
+      </p:pic>
+      <p:pic>
+        <p:nvPicPr>
+          <p:cNvPr id="15" name="Picture 9" descr="Icon&#10;&#10;Description automatically generated">
+            <a:extLst>
+              <a:ext uri="{FF2B5EF4-FFF2-40B4-BE49-F238E27FC236}">
+                <a16:creationId xmlns:a16="http://schemas.microsoft.com/office/drawing/2014/main" id="{1FA75C6B-5149-4971-B8B1-884B4D818C59}"/>
+              </a:ext>
+            </a:extLst>
+          </p:cNvPr>
+          <p:cNvPicPr>
+            <a:picLocks noChangeAspect="1"/>
+          </p:cNvPicPr>
+          <p:nvPr/>
+        </p:nvPicPr>
+        <p:blipFill>
+          <a:blip r:embed="rId3"/>
+          <a:stretch>
+            <a:fillRect/>
+          </a:stretch>
+        </p:blipFill>
+        <p:spPr>
+          <a:xfrm>
+            <a:off x="3158288" y="5994480"/>
             <a:ext cx="360745" cy="351100"/>
           </a:xfrm>
           <a:prstGeom prst="rect">

</xml_diff>